<commit_message>
Update event queue diagrams
</commit_message>
<xml_diff>
--- a/VEEPortingGuide/images/event-queue-overview.pptx
+++ b/VEEPortingGuide/images/event-queue-overview.pptx
@@ -218,7 +218,7 @@
               <a:rPr lang="fr-FR" smtClean="0">
                 <a:latin typeface="Calibri Regular" charset="0"/>
               </a:rPr>
-              <a:t>mercredi 2 août 2023</a:t>
+              <a:t>jeudi 3 août 2023</a:t>
             </a:fld>
             <a:endParaRPr lang="en-US" dirty="0">
               <a:latin typeface="Calibri Regular" charset="0"/>
@@ -396,7 +396,7 @@
           <a:p>
             <a:fld id="{885721CF-495B-2B41-A23A-4D3221F80235}" type="datetime2">
               <a:rPr lang="fr-FR" smtClean="0"/>
-              <a:t>mercredi 2 août 2023</a:t>
+              <a:t>jeudi 3 août 2023</a:t>
             </a:fld>
             <a:endParaRPr lang="en-US" dirty="0"/>
           </a:p>
@@ -16853,7 +16853,7 @@
                 <a:pPr algn="ctr"/>
                 <a:r>
                   <a:rPr lang="en-US" sz="1200" dirty="0"/>
-                  <a:t>Event Listener 1</a:t>
+                  <a:t>Event Listener A</a:t>
                 </a:r>
               </a:p>
             </p:txBody>
@@ -17011,30 +17011,8 @@
                     <a:ea typeface="Source Sans Pro Light" charset="0"/>
                     <a:cs typeface="Source Sans Pro Light" charset="0"/>
                   </a:rPr>
-                  <a:t>Event </a:t>
+                  <a:t>Event N</a:t>
                 </a:r>
-                <a:r>
-                  <a:rPr lang="en-US" sz="1200" dirty="0">
-                    <a:solidFill>
-                      <a:schemeClr val="tx2"/>
-                    </a:solidFill>
-                    <a:latin typeface="Source Sans Pro Light" charset="0"/>
-                    <a:ea typeface="Source Sans Pro Light" charset="0"/>
-                    <a:cs typeface="Source Sans Pro Light" charset="0"/>
-                  </a:rPr>
-                  <a:t>Z</a:t>
-                </a:r>
-                <a:endParaRPr lang="en-US" sz="1200" b="0" i="0" spc="0" dirty="0">
-                  <a:ln>
-                    <a:noFill/>
-                  </a:ln>
-                  <a:solidFill>
-                    <a:schemeClr val="tx2"/>
-                  </a:solidFill>
-                  <a:latin typeface="Source Sans Pro Light" charset="0"/>
-                  <a:ea typeface="Source Sans Pro Light" charset="0"/>
-                  <a:cs typeface="Source Sans Pro Light" charset="0"/>
-                </a:endParaRPr>
               </a:p>
             </p:txBody>
           </p:sp>
@@ -17172,7 +17150,7 @@
                     <a:ea typeface="Source Sans Pro Light" charset="0"/>
                     <a:cs typeface="Source Sans Pro Light" charset="0"/>
                   </a:rPr>
-                  <a:t>Event A</a:t>
+                  <a:t>Event 1</a:t>
                 </a:r>
               </a:p>
             </p:txBody>
@@ -17307,7 +17285,7 @@
                 <a:pPr algn="ctr"/>
                 <a:r>
                   <a:rPr lang="en-US" sz="1200" dirty="0"/>
-                  <a:t>Event Listener N</a:t>
+                  <a:t>Event Listener Z</a:t>
                 </a:r>
               </a:p>
             </p:txBody>

</xml_diff>